<commit_message>
Rewriting poste and fixed export func
</commit_message>
<xml_diff>
--- a/Doc/poster.pptx
+++ b/Doc/poster.pptx
@@ -54,10 +54,10 @@
           <c:layoutTarget val="inner"/>
           <c:xMode val="edge"/>
           <c:yMode val="edge"/>
-          <c:x val="0.117205895177466"/>
-          <c:y val="0.13003213003213"/>
-          <c:w val="0.872678119822098"/>
-          <c:h val="0.493479493479494"/>
+          <c:x val="0.117216117216117"/>
+          <c:y val="0.130056710775047"/>
+          <c:w val="0.87257980115123"/>
+          <c:h val="0.493383742911153"/>
         </c:manualLayout>
       </c:layout>
       <c:bar3DChart>
@@ -333,12 +333,12 @@
         </c:ser>
         <c:gapWidth val="150"/>
         <c:shape val="box"/>
-        <c:axId val="47138753"/>
-        <c:axId val="31540123"/>
+        <c:axId val="15469231"/>
+        <c:axId val="65816893"/>
         <c:axId val="0"/>
       </c:bar3DChart>
       <c:catAx>
-        <c:axId val="47138753"/>
+        <c:axId val="15469231"/>
         <c:scaling>
           <c:orientation val="minMax"/>
         </c:scaling>
@@ -368,14 +368,14 @@
             </a:pPr>
           </a:p>
         </c:txPr>
-        <c:crossAx val="31540123"/>
+        <c:crossAx val="65816893"/>
         <c:crosses val="autoZero"/>
         <c:auto val="1"/>
         <c:lblAlgn val="ctr"/>
         <c:lblOffset val="100"/>
       </c:catAx>
       <c:valAx>
-        <c:axId val="31540123"/>
+        <c:axId val="65816893"/>
         <c:scaling>
           <c:orientation val="minMax"/>
         </c:scaling>
@@ -415,7 +415,7 @@
             </a:pPr>
           </a:p>
         </c:txPr>
-        <c:crossAx val="47138753"/>
+        <c:crossAx val="15469231"/>
         <c:crosses val="autoZero"/>
       </c:valAx>
     </c:plotArea>
@@ -2142,7 +2142,7 @@
         <p:spPr>
           <a:xfrm>
             <a:off x="136080" y="176400"/>
-            <a:ext cx="9347040" cy="1283400"/>
+            <a:ext cx="9346680" cy="1283040"/>
           </a:xfrm>
           <a:prstGeom prst="rect">
             <a:avLst/>
@@ -2245,7 +2245,7 @@
         <p:spPr>
           <a:xfrm>
             <a:off x="85320" y="1309680"/>
-            <a:ext cx="4443120" cy="932400"/>
+            <a:ext cx="4442760" cy="932040"/>
           </a:xfrm>
           <a:prstGeom prst="rect">
             <a:avLst/>
@@ -2296,7 +2296,7 @@
         <p:spPr>
           <a:xfrm>
             <a:off x="130320" y="6676560"/>
-            <a:ext cx="3516120" cy="666720"/>
+            <a:ext cx="3515760" cy="666360"/>
           </a:xfrm>
           <a:prstGeom prst="rect">
             <a:avLst/>
@@ -2347,7 +2347,7 @@
         <p:spPr>
           <a:xfrm>
             <a:off x="4914360" y="1434600"/>
-            <a:ext cx="4519800" cy="712800"/>
+            <a:ext cx="4519440" cy="712440"/>
           </a:xfrm>
           <a:prstGeom prst="rect">
             <a:avLst/>
@@ -2398,7 +2398,7 @@
         <p:spPr>
           <a:xfrm>
             <a:off x="201960" y="1957680"/>
-            <a:ext cx="4461840" cy="4989960"/>
+            <a:ext cx="4461480" cy="4989960"/>
           </a:xfrm>
           <a:prstGeom prst="rect">
             <a:avLst/>
@@ -2419,7 +2419,7 @@
             <a:spAutoFit/>
           </a:bodyPr>
           <a:p>
-            <a:pPr marL="285840" indent="-284040">
+            <a:pPr marL="285840" indent="-283680">
               <a:lnSpc>
                 <a:spcPct val="100000"/>
               </a:lnSpc>
@@ -2447,7 +2447,7 @@
             </a:endParaRPr>
           </a:p>
           <a:p>
-            <a:pPr marL="285840" indent="-284040">
+            <a:pPr marL="285840" indent="-283680">
               <a:lnSpc>
                 <a:spcPct val="100000"/>
               </a:lnSpc>
@@ -2475,7 +2475,7 @@
             </a:endParaRPr>
           </a:p>
           <a:p>
-            <a:pPr lvl="1" marL="743040" indent="-284040">
+            <a:pPr lvl="1" marL="743040" indent="-283680">
               <a:lnSpc>
                 <a:spcPct val="100000"/>
               </a:lnSpc>
@@ -2503,7 +2503,7 @@
             </a:endParaRPr>
           </a:p>
           <a:p>
-            <a:pPr lvl="1" marL="743040" indent="-284040">
+            <a:pPr lvl="1" marL="743040" indent="-283680">
               <a:lnSpc>
                 <a:spcPct val="100000"/>
               </a:lnSpc>
@@ -2531,7 +2531,7 @@
             </a:endParaRPr>
           </a:p>
           <a:p>
-            <a:pPr lvl="1" marL="743040" indent="-284040">
+            <a:pPr lvl="1" marL="743040" indent="-283680">
               <a:lnSpc>
                 <a:spcPct val="100000"/>
               </a:lnSpc>
@@ -2559,7 +2559,7 @@
             </a:endParaRPr>
           </a:p>
           <a:p>
-            <a:pPr lvl="1" marL="743040" indent="-284040">
+            <a:pPr lvl="1" marL="743040" indent="-283680">
               <a:lnSpc>
                 <a:spcPct val="100000"/>
               </a:lnSpc>
@@ -2587,7 +2587,7 @@
             </a:endParaRPr>
           </a:p>
           <a:p>
-            <a:pPr marL="285840" indent="-284040">
+            <a:pPr marL="285840" indent="-283680">
               <a:lnSpc>
                 <a:spcPct val="100000"/>
               </a:lnSpc>
@@ -2615,7 +2615,7 @@
             </a:endParaRPr>
           </a:p>
           <a:p>
-            <a:pPr marL="285840" indent="-284040">
+            <a:pPr marL="285840" indent="-283680">
               <a:lnSpc>
                 <a:spcPct val="100000"/>
               </a:lnSpc>
@@ -2643,7 +2643,7 @@
             </a:endParaRPr>
           </a:p>
           <a:p>
-            <a:pPr lvl="1" marL="743040" indent="-284040">
+            <a:pPr lvl="1" marL="743040" indent="-283680">
               <a:lnSpc>
                 <a:spcPct val="100000"/>
               </a:lnSpc>
@@ -2671,7 +2671,7 @@
             </a:endParaRPr>
           </a:p>
           <a:p>
-            <a:pPr lvl="1" marL="743040" indent="-284040">
+            <a:pPr lvl="1" marL="743040" indent="-283680">
               <a:lnSpc>
                 <a:spcPct val="100000"/>
               </a:lnSpc>
@@ -2699,7 +2699,7 @@
             </a:endParaRPr>
           </a:p>
           <a:p>
-            <a:pPr lvl="1" marL="743040" indent="-284040">
+            <a:pPr lvl="1" marL="743040" indent="-283680">
               <a:lnSpc>
                 <a:spcPct val="100000"/>
               </a:lnSpc>
@@ -2737,7 +2737,7 @@
         <p:spPr>
           <a:xfrm>
             <a:off x="257400" y="7235280"/>
-            <a:ext cx="4418280" cy="5038560"/>
+            <a:ext cx="4417920" cy="5038200"/>
           </a:xfrm>
           <a:prstGeom prst="rect">
             <a:avLst/>
@@ -2778,7 +2778,7 @@
             </a:endParaRPr>
           </a:p>
           <a:p>
-            <a:pPr marL="285840" indent="-284040">
+            <a:pPr marL="285840" indent="-283680">
               <a:lnSpc>
                 <a:spcPct val="100000"/>
               </a:lnSpc>
@@ -2803,7 +2803,7 @@
             </a:endParaRPr>
           </a:p>
           <a:p>
-            <a:pPr lvl="1" marL="743040" indent="-284040">
+            <a:pPr lvl="1" marL="743040" indent="-283680">
               <a:lnSpc>
                 <a:spcPct val="100000"/>
               </a:lnSpc>
@@ -2828,7 +2828,7 @@
             </a:endParaRPr>
           </a:p>
           <a:p>
-            <a:pPr lvl="1" marL="743040" indent="-284040">
+            <a:pPr lvl="1" marL="743040" indent="-283680">
               <a:lnSpc>
                 <a:spcPct val="100000"/>
               </a:lnSpc>
@@ -2853,7 +2853,7 @@
             </a:endParaRPr>
           </a:p>
           <a:p>
-            <a:pPr lvl="1" marL="743040" indent="-284040">
+            <a:pPr lvl="1" marL="743040" indent="-283680">
               <a:lnSpc>
                 <a:spcPct val="100000"/>
               </a:lnSpc>
@@ -2878,7 +2878,7 @@
             </a:endParaRPr>
           </a:p>
           <a:p>
-            <a:pPr marL="285840" indent="-284040">
+            <a:pPr marL="285840" indent="-283680">
               <a:lnSpc>
                 <a:spcPct val="100000"/>
               </a:lnSpc>
@@ -2903,7 +2903,7 @@
             </a:endParaRPr>
           </a:p>
           <a:p>
-            <a:pPr marL="285840" indent="-284040">
+            <a:pPr marL="285840" indent="-283680">
               <a:lnSpc>
                 <a:spcPct val="100000"/>
               </a:lnSpc>
@@ -2928,7 +2928,7 @@
             </a:endParaRPr>
           </a:p>
           <a:p>
-            <a:pPr marL="285840" indent="-284040">
+            <a:pPr marL="285840" indent="-283680">
               <a:lnSpc>
                 <a:spcPct val="100000"/>
               </a:lnSpc>
@@ -2983,7 +2983,7 @@
             </a:endParaRPr>
           </a:p>
           <a:p>
-            <a:pPr marL="285840" indent="-284040">
+            <a:pPr marL="285840" indent="-283680">
               <a:lnSpc>
                 <a:spcPts val="1800"/>
               </a:lnSpc>
@@ -3038,7 +3038,7 @@
             </a:endParaRPr>
           </a:p>
           <a:p>
-            <a:pPr marL="285840" indent="-284040">
+            <a:pPr marL="285840" indent="-283680">
               <a:lnSpc>
                 <a:spcPts val="1800"/>
               </a:lnSpc>
@@ -3083,7 +3083,7 @@
         <p:spPr>
           <a:xfrm>
             <a:off x="4827240" y="10070640"/>
-            <a:ext cx="4411440" cy="509400"/>
+            <a:ext cx="4411080" cy="509040"/>
           </a:xfrm>
           <a:prstGeom prst="rect">
             <a:avLst/>
@@ -3134,7 +3134,7 @@
         <p:spPr>
           <a:xfrm>
             <a:off x="4896720" y="7141680"/>
-            <a:ext cx="4207320" cy="712800"/>
+            <a:ext cx="4206960" cy="712440"/>
           </a:xfrm>
           <a:prstGeom prst="rect">
             <a:avLst/>
@@ -3185,7 +3185,7 @@
         <p:spPr>
           <a:xfrm>
             <a:off x="4868280" y="10474200"/>
-            <a:ext cx="4731120" cy="2036520"/>
+            <a:ext cx="4730760" cy="2036520"/>
           </a:xfrm>
           <a:prstGeom prst="rect">
             <a:avLst/>
@@ -3310,7 +3310,7 @@
         <p:spPr>
           <a:xfrm>
             <a:off x="8365680" y="1037880"/>
-            <a:ext cx="975240" cy="356400"/>
+            <a:ext cx="974880" cy="356040"/>
           </a:xfrm>
           <a:prstGeom prst="rect">
             <a:avLst/>
@@ -3350,7 +3350,7 @@
         <p:spPr>
           <a:xfrm>
             <a:off x="5112000" y="2016000"/>
-            <a:ext cx="3310560" cy="1965600"/>
+            <a:ext cx="3310200" cy="1965240"/>
           </a:xfrm>
           <a:prstGeom prst="rect">
             <a:avLst/>
@@ -3374,7 +3374,7 @@
         <p:spPr>
           <a:xfrm>
             <a:off x="5100480" y="4536000"/>
-            <a:ext cx="1510560" cy="1366560"/>
+            <a:ext cx="1510200" cy="1366200"/>
           </a:xfrm>
           <a:prstGeom prst="rect">
             <a:avLst/>
@@ -3393,7 +3393,7 @@
         <p:spPr>
           <a:xfrm>
             <a:off x="5111640" y="3960000"/>
-            <a:ext cx="4103640" cy="515880"/>
+            <a:ext cx="4103280" cy="303480"/>
           </a:xfrm>
           <a:prstGeom prst="rect">
             <a:avLst/>
@@ -3433,26 +3433,6 @@
               <a:latin typeface="Arial"/>
             </a:endParaRPr>
           </a:p>
-          <a:p>
-            <a:pPr>
-              <a:lnSpc>
-                <a:spcPct val="100000"/>
-              </a:lnSpc>
-            </a:pPr>
-            <a:r>
-              <a:rPr b="0" lang="en-US" sz="1400" spc="-1" strike="noStrike">
-                <a:solidFill>
-                  <a:srgbClr val="000000"/>
-                </a:solidFill>
-                <a:latin typeface="Arial"/>
-                <a:ea typeface="DejaVu Sans"/>
-              </a:rPr>
-              <a:t>The graph contains a list of nodes.</a:t>
-            </a:r>
-            <a:endParaRPr b="0" lang="en-US" sz="1400" spc="-1" strike="noStrike">
-              <a:latin typeface="Arial"/>
-            </a:endParaRPr>
-          </a:p>
         </p:txBody>
       </p:sp>
       <p:sp>
@@ -3464,7 +3444,7 @@
         <p:spPr>
           <a:xfrm>
             <a:off x="5100480" y="5903640"/>
-            <a:ext cx="4318920" cy="515880"/>
+            <a:ext cx="4318560" cy="515880"/>
           </a:xfrm>
           <a:prstGeom prst="rect">
             <a:avLst/>
@@ -3914,27 +3894,6 @@
                   </a:tcPr>
                 </a:tc>
                 <a:tc>
-                  <a:txBody>
-                    <a:bodyPr>
-                      <a:noAutofit/>
-                    </a:bodyPr>
-                    <a:p>
-                      <a:pPr>
-                        <a:lnSpc>
-                          <a:spcPct val="100000"/>
-                        </a:lnSpc>
-                      </a:pPr>
-                      <a:r>
-                        <a:rPr b="0" lang="en-US" sz="1600" spc="-1" strike="noStrike">
-                          <a:latin typeface="Arial"/>
-                        </a:rPr>
-                        <a:t>Transforming  shape</a:t>
-                      </a:r>
-                      <a:endParaRPr b="0" lang="en-US" sz="1600" spc="-1" strike="noStrike">
-                        <a:latin typeface="Arial"/>
-                      </a:endParaRPr>
-                    </a:p>
-                  </a:txBody>
                   <a:tcPr marL="91440" marR="91440">
                     <a:lnL w="12240">
                       <a:solidFill>
@@ -4140,7 +4099,7 @@
         <p:spPr>
           <a:xfrm>
             <a:off x="4992480" y="6507000"/>
-            <a:ext cx="4799520" cy="577080"/>
+            <a:ext cx="4799160" cy="576720"/>
           </a:xfrm>
           <a:prstGeom prst="rect">
             <a:avLst/>
@@ -4187,7 +4146,7 @@
               <a:t>Able to generate a shader that union of spheres (Figure 2) from a Node graph.</a:t>
             </a:r>
             <a:endParaRPr b="0" lang="en-US" sz="1600" spc="-1" strike="noStrike">
-              <a:latin typeface="DejaVu Sans"/>
+              <a:latin typeface="Arial"/>
             </a:endParaRPr>
           </a:p>
         </p:txBody>
@@ -4257,7 +4216,7 @@
         </p:nvGraphicFramePr>
         <p:xfrm>
           <a:off x="4872600" y="3648960"/>
-          <a:ext cx="4127760" cy="1904400"/>
+          <a:ext cx="4127400" cy="1904040"/>
         </p:xfrm>
         <a:graphic>
           <a:graphicData uri="http://schemas.openxmlformats.org/drawingml/2006/chart">
@@ -4274,7 +4233,7 @@
         <p:spPr>
           <a:xfrm>
             <a:off x="136080" y="176400"/>
-            <a:ext cx="9347040" cy="1283400"/>
+            <a:ext cx="9346680" cy="1283040"/>
           </a:xfrm>
           <a:prstGeom prst="rect">
             <a:avLst/>
@@ -4377,7 +4336,7 @@
         <p:spPr>
           <a:xfrm>
             <a:off x="120240" y="1434600"/>
-            <a:ext cx="4443120" cy="932400"/>
+            <a:ext cx="4442760" cy="932040"/>
           </a:xfrm>
           <a:prstGeom prst="rect">
             <a:avLst/>
@@ -4458,7 +4417,7 @@
         <p:spPr>
           <a:xfrm>
             <a:off x="120240" y="7245000"/>
-            <a:ext cx="3516120" cy="666720"/>
+            <a:ext cx="3515760" cy="666360"/>
           </a:xfrm>
           <a:prstGeom prst="rect">
             <a:avLst/>
@@ -4509,7 +4468,7 @@
         <p:spPr>
           <a:xfrm>
             <a:off x="4914360" y="1434600"/>
-            <a:ext cx="4519800" cy="712800"/>
+            <a:ext cx="4519440" cy="712440"/>
           </a:xfrm>
           <a:prstGeom prst="rect">
             <a:avLst/>
@@ -4560,7 +4519,7 @@
         <p:spPr>
           <a:xfrm>
             <a:off x="490680" y="11214360"/>
-            <a:ext cx="3998520" cy="1299600"/>
+            <a:ext cx="3998160" cy="1299240"/>
           </a:xfrm>
           <a:prstGeom prst="rect">
             <a:avLst/>
@@ -4621,7 +4580,7 @@
         <p:spPr>
           <a:xfrm>
             <a:off x="5130720" y="9826200"/>
-            <a:ext cx="4033080" cy="1542240"/>
+            <a:ext cx="4032720" cy="1541880"/>
           </a:xfrm>
           <a:prstGeom prst="rect">
             <a:avLst/>
@@ -4732,7 +4691,7 @@
         <p:spPr>
           <a:xfrm>
             <a:off x="336240" y="2226600"/>
-            <a:ext cx="3834000" cy="1869480"/>
+            <a:ext cx="3833640" cy="1869480"/>
           </a:xfrm>
           <a:prstGeom prst="rect">
             <a:avLst/>
@@ -4776,7 +4735,7 @@
             </a:endParaRPr>
           </a:p>
           <a:p>
-            <a:pPr marL="185760" indent="-182160">
+            <a:pPr marL="185760" indent="-181800">
               <a:lnSpc>
                 <a:spcPct val="100000"/>
               </a:lnSpc>
@@ -4801,7 +4760,7 @@
             </a:endParaRPr>
           </a:p>
           <a:p>
-            <a:pPr marL="185760" indent="-182160">
+            <a:pPr marL="185760" indent="-181800">
               <a:lnSpc>
                 <a:spcPct val="100000"/>
               </a:lnSpc>
@@ -4826,7 +4785,7 @@
             </a:endParaRPr>
           </a:p>
           <a:p>
-            <a:pPr marL="185760" indent="-182160">
+            <a:pPr marL="185760" indent="-181800">
               <a:lnSpc>
                 <a:spcPct val="100000"/>
               </a:lnSpc>
@@ -4851,7 +4810,7 @@
             </a:endParaRPr>
           </a:p>
           <a:p>
-            <a:pPr marL="185760" indent="-182160">
+            <a:pPr marL="185760" indent="-181800">
               <a:lnSpc>
                 <a:spcPct val="100000"/>
               </a:lnSpc>
@@ -4876,7 +4835,7 @@
             </a:endParaRPr>
           </a:p>
           <a:p>
-            <a:pPr marL="185760" indent="-182160">
+            <a:pPr marL="185760" indent="-181800">
               <a:lnSpc>
                 <a:spcPct val="100000"/>
               </a:lnSpc>
@@ -4911,7 +4870,7 @@
         <p:spPr>
           <a:xfrm>
             <a:off x="336240" y="7799400"/>
-            <a:ext cx="3956760" cy="3366360"/>
+            <a:ext cx="3956400" cy="3366360"/>
           </a:xfrm>
           <a:prstGeom prst="rect">
             <a:avLst/>
@@ -4955,7 +4914,7 @@
             </a:endParaRPr>
           </a:p>
           <a:p>
-            <a:pPr marL="185760" indent="-182160">
+            <a:pPr marL="185760" indent="-181800">
               <a:lnSpc>
                 <a:spcPts val="1800"/>
               </a:lnSpc>
@@ -4980,7 +4939,7 @@
             </a:endParaRPr>
           </a:p>
           <a:p>
-            <a:pPr marL="185760" indent="-182160">
+            <a:pPr marL="185760" indent="-181800">
               <a:lnSpc>
                 <a:spcPts val="1800"/>
               </a:lnSpc>
@@ -5005,7 +4964,7 @@
             </a:endParaRPr>
           </a:p>
           <a:p>
-            <a:pPr marL="185760" indent="-182160">
+            <a:pPr marL="185760" indent="-181800">
               <a:lnSpc>
                 <a:spcPts val="1800"/>
               </a:lnSpc>
@@ -5150,7 +5109,7 @@
         <p:spPr>
           <a:xfrm>
             <a:off x="5160600" y="1938600"/>
-            <a:ext cx="4003200" cy="1869480"/>
+            <a:ext cx="4002840" cy="1869480"/>
           </a:xfrm>
           <a:prstGeom prst="rect">
             <a:avLst/>
@@ -5194,7 +5153,7 @@
             </a:endParaRPr>
           </a:p>
           <a:p>
-            <a:pPr marL="185760" indent="-182160">
+            <a:pPr marL="185760" indent="-181800">
               <a:lnSpc>
                 <a:spcPct val="100000"/>
               </a:lnSpc>
@@ -5219,7 +5178,7 @@
             </a:endParaRPr>
           </a:p>
           <a:p>
-            <a:pPr marL="185760" indent="-182160">
+            <a:pPr marL="185760" indent="-181800">
               <a:lnSpc>
                 <a:spcPct val="100000"/>
               </a:lnSpc>
@@ -5244,7 +5203,7 @@
             </a:endParaRPr>
           </a:p>
           <a:p>
-            <a:pPr marL="185760" indent="-182160">
+            <a:pPr marL="185760" indent="-181800">
               <a:lnSpc>
                 <a:spcPct val="100000"/>
               </a:lnSpc>
@@ -5289,7 +5248,7 @@
         <p:spPr>
           <a:xfrm>
             <a:off x="4914360" y="11301840"/>
-            <a:ext cx="4411440" cy="509400"/>
+            <a:ext cx="4411080" cy="509040"/>
           </a:xfrm>
           <a:prstGeom prst="rect">
             <a:avLst/>
@@ -5340,7 +5299,7 @@
         <p:spPr>
           <a:xfrm>
             <a:off x="4907880" y="6970680"/>
-            <a:ext cx="4207320" cy="712800"/>
+            <a:ext cx="4206960" cy="712440"/>
           </a:xfrm>
           <a:prstGeom prst="rect">
             <a:avLst/>
@@ -5391,7 +5350,7 @@
         <p:spPr>
           <a:xfrm>
             <a:off x="5108400" y="7687080"/>
-            <a:ext cx="4179240" cy="2112840"/>
+            <a:ext cx="4178880" cy="2112840"/>
           </a:xfrm>
           <a:prstGeom prst="rect">
             <a:avLst/>
@@ -5435,7 +5394,7 @@
             </a:endParaRPr>
           </a:p>
           <a:p>
-            <a:pPr marL="185760" indent="-182160">
+            <a:pPr marL="185760" indent="-181800">
               <a:lnSpc>
                 <a:spcPct val="100000"/>
               </a:lnSpc>
@@ -5460,7 +5419,7 @@
             </a:endParaRPr>
           </a:p>
           <a:p>
-            <a:pPr marL="185760" indent="-182160">
+            <a:pPr marL="185760" indent="-181800">
               <a:lnSpc>
                 <a:spcPct val="100000"/>
               </a:lnSpc>
@@ -5485,7 +5444,7 @@
             </a:endParaRPr>
           </a:p>
           <a:p>
-            <a:pPr marL="185760" indent="-182160">
+            <a:pPr marL="185760" indent="-181800">
               <a:lnSpc>
                 <a:spcPct val="100000"/>
               </a:lnSpc>
@@ -5510,7 +5469,7 @@
             </a:endParaRPr>
           </a:p>
           <a:p>
-            <a:pPr marL="185760" indent="-182160">
+            <a:pPr marL="185760" indent="-181800">
               <a:lnSpc>
                 <a:spcPct val="100000"/>
               </a:lnSpc>
@@ -5535,7 +5494,7 @@
             </a:endParaRPr>
           </a:p>
           <a:p>
-            <a:pPr marL="185760" indent="-182160">
+            <a:pPr marL="185760" indent="-181800">
               <a:lnSpc>
                 <a:spcPct val="100000"/>
               </a:lnSpc>
@@ -5570,7 +5529,7 @@
         <p:spPr>
           <a:xfrm>
             <a:off x="5016600" y="5599440"/>
-            <a:ext cx="4033080" cy="1381320"/>
+            <a:ext cx="4032720" cy="1380960"/>
           </a:xfrm>
           <a:prstGeom prst="rect">
             <a:avLst/>
@@ -5659,7 +5618,7 @@
         <p:spPr>
           <a:xfrm>
             <a:off x="5160600" y="11656080"/>
-            <a:ext cx="4472640" cy="1063080"/>
+            <a:ext cx="4472280" cy="1063080"/>
           </a:xfrm>
           <a:prstGeom prst="rect">
             <a:avLst/>
@@ -5764,7 +5723,7 @@
         <p:spPr>
           <a:xfrm>
             <a:off x="8365680" y="1037880"/>
-            <a:ext cx="975240" cy="356400"/>
+            <a:ext cx="974880" cy="356040"/>
           </a:xfrm>
           <a:prstGeom prst="rect">
             <a:avLst/>
@@ -5855,7 +5814,7 @@
         <p:spPr>
           <a:xfrm>
             <a:off x="207000" y="4119480"/>
-            <a:ext cx="4445640" cy="3285720"/>
+            <a:ext cx="4445280" cy="3285360"/>
           </a:xfrm>
           <a:prstGeom prst="rect">
             <a:avLst/>
@@ -5906,7 +5865,7 @@
             </a:endParaRPr>
           </a:p>
           <a:p>
-            <a:pPr marL="179280" indent="-175680">
+            <a:pPr marL="179280" indent="-175320">
               <a:lnSpc>
                 <a:spcPct val="100000"/>
               </a:lnSpc>
@@ -5951,7 +5910,7 @@
             </a:endParaRPr>
           </a:p>
           <a:p>
-            <a:pPr marL="179280" indent="-175680">
+            <a:pPr marL="179280" indent="-175320">
               <a:lnSpc>
                 <a:spcPct val="100000"/>
               </a:lnSpc>
@@ -5996,7 +5955,7 @@
             </a:endParaRPr>
           </a:p>
           <a:p>
-            <a:pPr marL="179280" indent="-175680">
+            <a:pPr marL="179280" indent="-175320">
               <a:lnSpc>
                 <a:spcPct val="100000"/>
               </a:lnSpc>
@@ -6041,7 +6000,7 @@
             </a:endParaRPr>
           </a:p>
           <a:p>
-            <a:pPr marL="179280" indent="-175680">
+            <a:pPr marL="179280" indent="-175320">
               <a:lnSpc>
                 <a:spcPct val="100000"/>
               </a:lnSpc>
@@ -6066,7 +6025,7 @@
             </a:endParaRPr>
           </a:p>
           <a:p>
-            <a:pPr marL="179280" indent="-175680">
+            <a:pPr marL="179280" indent="-175320">
               <a:lnSpc>
                 <a:spcPct val="100000"/>
               </a:lnSpc>
@@ -6091,7 +6050,7 @@
             </a:endParaRPr>
           </a:p>
           <a:p>
-            <a:pPr marL="179280" indent="-175680">
+            <a:pPr marL="179280" indent="-175320">
               <a:lnSpc>
                 <a:spcPct val="100000"/>
               </a:lnSpc>
@@ -6126,7 +6085,7 @@
         <p:spPr>
           <a:xfrm>
             <a:off x="5016600" y="3580200"/>
-            <a:ext cx="4033080" cy="1911240"/>
+            <a:ext cx="4032720" cy="1910880"/>
           </a:xfrm>
           <a:prstGeom prst="rect">
             <a:avLst/>

</xml_diff>